<commit_message>
Notebook and Presentation Completed
</commit_message>
<xml_diff>
--- a/Project Presentation.pptx
+++ b/Project Presentation.pptx
@@ -5,37 +5,39 @@
     <p:sldMasterId id="2147483659" r:id="rId1"/>
   </p:sldMasterIdLst>
   <p:notesMasterIdLst>
-    <p:notesMasterId r:id="rId20"/>
+    <p:notesMasterId r:id="rId22"/>
   </p:notesMasterIdLst>
   <p:sldIdLst>
     <p:sldId id="256" r:id="rId2"/>
     <p:sldId id="257" r:id="rId3"/>
     <p:sldId id="258" r:id="rId4"/>
     <p:sldId id="259" r:id="rId5"/>
-    <p:sldId id="260" r:id="rId6"/>
-    <p:sldId id="276" r:id="rId7"/>
-    <p:sldId id="277" r:id="rId8"/>
-    <p:sldId id="261" r:id="rId9"/>
-    <p:sldId id="262" r:id="rId10"/>
-    <p:sldId id="263" r:id="rId11"/>
-    <p:sldId id="278" r:id="rId12"/>
-    <p:sldId id="279" r:id="rId13"/>
-    <p:sldId id="264" r:id="rId14"/>
-    <p:sldId id="265" r:id="rId15"/>
-    <p:sldId id="280" r:id="rId16"/>
-    <p:sldId id="281" r:id="rId17"/>
-    <p:sldId id="266" r:id="rId18"/>
-    <p:sldId id="267" r:id="rId19"/>
+    <p:sldId id="282" r:id="rId6"/>
+    <p:sldId id="260" r:id="rId7"/>
+    <p:sldId id="276" r:id="rId8"/>
+    <p:sldId id="277" r:id="rId9"/>
+    <p:sldId id="261" r:id="rId10"/>
+    <p:sldId id="262" r:id="rId11"/>
+    <p:sldId id="263" r:id="rId12"/>
+    <p:sldId id="278" r:id="rId13"/>
+    <p:sldId id="279" r:id="rId14"/>
+    <p:sldId id="264" r:id="rId15"/>
+    <p:sldId id="265" r:id="rId16"/>
+    <p:sldId id="280" r:id="rId17"/>
+    <p:sldId id="281" r:id="rId18"/>
+    <p:sldId id="266" r:id="rId19"/>
+    <p:sldId id="284" r:id="rId20"/>
+    <p:sldId id="267" r:id="rId21"/>
   </p:sldIdLst>
   <p:sldSz cx="9144000" cy="5143500" type="screen16x9"/>
   <p:notesSz cx="6858000" cy="9144000"/>
   <p:embeddedFontLst>
     <p:embeddedFont>
       <p:font typeface="Montserrat" panose="00000500000000000000" pitchFamily="2" charset="0"/>
-      <p:regular r:id="rId21"/>
-      <p:bold r:id="rId22"/>
-      <p:italic r:id="rId23"/>
-      <p:boldItalic r:id="rId24"/>
+      <p:regular r:id="rId23"/>
+      <p:bold r:id="rId24"/>
+      <p:italic r:id="rId25"/>
+      <p:boldItalic r:id="rId26"/>
     </p:embeddedFont>
   </p:embeddedFontLst>
   <p:defaultTextStyle>
@@ -1874,6 +1876,133 @@
 </file>
 
 <file path=ppt/notesSlides/notesSlide17.xml><?xml version="1.0" encoding="utf-8"?>
+<p:notes xmlns:a="http://schemas.openxmlformats.org/drawingml/2006/main" xmlns:r="http://schemas.openxmlformats.org/officeDocument/2006/relationships" xmlns:p="http://schemas.openxmlformats.org/presentationml/2006/main" showMasterSp="0" showMasterPhAnim="0">
+  <p:cSld>
+    <p:spTree>
+      <p:nvGrpSpPr>
+        <p:cNvPr id="1" name="Shape 56"/>
+        <p:cNvGrpSpPr/>
+        <p:nvPr/>
+      </p:nvGrpSpPr>
+      <p:grpSpPr>
+        <a:xfrm>
+          <a:off x="0" y="0"/>
+          <a:ext cx="0" cy="0"/>
+          <a:chOff x="0" y="0"/>
+          <a:chExt cx="0" cy="0"/>
+        </a:xfrm>
+      </p:grpSpPr>
+      <p:sp>
+        <p:nvSpPr>
+          <p:cNvPr id="57" name="Google Shape;57;gbd08f57e3d_0_0:notes"/>
+          <p:cNvSpPr>
+            <a:spLocks noGrp="1" noRot="1" noChangeAspect="1"/>
+          </p:cNvSpPr>
+          <p:nvPr>
+            <p:ph type="sldImg" idx="2"/>
+          </p:nvPr>
+        </p:nvSpPr>
+        <p:spPr>
+          <a:xfrm>
+            <a:off x="381000" y="685800"/>
+            <a:ext cx="6096000" cy="3429000"/>
+          </a:xfrm>
+          <a:custGeom>
+            <a:avLst/>
+            <a:gdLst/>
+            <a:ahLst/>
+            <a:cxnLst/>
+            <a:rect l="l" t="t" r="r" b="b"/>
+            <a:pathLst>
+              <a:path w="120000" h="120000" extrusionOk="0">
+                <a:moveTo>
+                  <a:pt x="0" y="0"/>
+                </a:moveTo>
+                <a:lnTo>
+                  <a:pt x="120000" y="0"/>
+                </a:lnTo>
+                <a:lnTo>
+                  <a:pt x="120000" y="120000"/>
+                </a:lnTo>
+                <a:lnTo>
+                  <a:pt x="0" y="120000"/>
+                </a:lnTo>
+                <a:close/>
+              </a:path>
+            </a:pathLst>
+          </a:custGeom>
+          <a:noFill/>
+          <a:ln w="9525" cap="flat" cmpd="sng">
+            <a:solidFill>
+              <a:srgbClr val="000000"/>
+            </a:solidFill>
+            <a:prstDash val="solid"/>
+            <a:round/>
+            <a:headEnd type="none" w="sm" len="sm"/>
+            <a:tailEnd type="none" w="sm" len="sm"/>
+          </a:ln>
+        </p:spPr>
+      </p:sp>
+      <p:sp>
+        <p:nvSpPr>
+          <p:cNvPr id="58" name="Google Shape;58;gbd08f57e3d_0_0:notes"/>
+          <p:cNvSpPr txBox="1">
+            <a:spLocks noGrp="1"/>
+          </p:cNvSpPr>
+          <p:nvPr>
+            <p:ph type="body" idx="1"/>
+          </p:nvPr>
+        </p:nvSpPr>
+        <p:spPr>
+          <a:xfrm>
+            <a:off x="685800" y="4343400"/>
+            <a:ext cx="5486400" cy="4114800"/>
+          </a:xfrm>
+          <a:prstGeom prst="rect">
+            <a:avLst/>
+          </a:prstGeom>
+          <a:noFill/>
+          <a:ln>
+            <a:noFill/>
+          </a:ln>
+        </p:spPr>
+        <p:txBody>
+          <a:bodyPr spcFirstLastPara="1" wrap="square" lIns="91425" tIns="91425" rIns="91425" bIns="91425" anchor="t" anchorCtr="0">
+            <a:noAutofit/>
+          </a:bodyPr>
+          <a:lstStyle/>
+          <a:p>
+            <a:pPr marL="0" lvl="0" indent="0" algn="l" rtl="0">
+              <a:lnSpc>
+                <a:spcPct val="100000"/>
+              </a:lnSpc>
+              <a:spcBef>
+                <a:spcPts val="0"/>
+              </a:spcBef>
+              <a:spcAft>
+                <a:spcPts val="0"/>
+              </a:spcAft>
+              <a:buSzPts val="1100"/>
+              <a:buNone/>
+            </a:pPr>
+            <a:endParaRPr/>
+          </a:p>
+        </p:txBody>
+      </p:sp>
+    </p:spTree>
+    <p:extLst>
+      <p:ext uri="{BB962C8B-B14F-4D97-AF65-F5344CB8AC3E}">
+        <p14:creationId xmlns:p14="http://schemas.microsoft.com/office/powerpoint/2010/main" val="3359125712"/>
+      </p:ext>
+    </p:extLst>
+  </p:cSld>
+  <p:clrMapOvr>
+    <a:masterClrMapping/>
+  </p:clrMapOvr>
+</p:notes>
+</file>
+
+<file path=ppt/notesSlides/notesSlide18.xml><?xml version="1.0" encoding="utf-8"?>
 <p:notes xmlns:a="http://schemas.openxmlformats.org/drawingml/2006/main" xmlns:r="http://schemas.openxmlformats.org/officeDocument/2006/relationships" xmlns:p="http://schemas.openxmlformats.org/presentationml/2006/main" showMasterSp="0" showMasterPhAnim="0">
   <p:cSld>
     <p:spTree>
@@ -11105,6 +11234,249 @@
           </p:nvPr>
         </p:nvSpPr>
         <p:spPr>
+          <a:prstGeom prst="rect">
+            <a:avLst/>
+          </a:prstGeom>
+          <a:noFill/>
+          <a:ln>
+            <a:noFill/>
+          </a:ln>
+        </p:spPr>
+        <p:txBody>
+          <a:bodyPr spcFirstLastPara="1" wrap="square" lIns="91425" tIns="91425" rIns="91425" bIns="91425" anchor="b" anchorCtr="0">
+            <a:noAutofit/>
+          </a:bodyPr>
+          <a:lstStyle/>
+          <a:p>
+            <a:pPr marL="0" lvl="0" indent="0" algn="l" rtl="0">
+              <a:lnSpc>
+                <a:spcPct val="100000"/>
+              </a:lnSpc>
+              <a:spcBef>
+                <a:spcPts val="0"/>
+              </a:spcBef>
+              <a:spcAft>
+                <a:spcPts val="0"/>
+              </a:spcAft>
+              <a:buSzPts val="5200"/>
+              <a:buNone/>
+            </a:pPr>
+            <a:endParaRPr sz="2400" b="1" dirty="0">
+              <a:solidFill>
+                <a:schemeClr val="lt1"/>
+              </a:solidFill>
+              <a:latin typeface="Montserrat"/>
+              <a:ea typeface="Montserrat"/>
+              <a:cs typeface="Montserrat"/>
+              <a:sym typeface="Montserrat"/>
+            </a:endParaRPr>
+          </a:p>
+          <a:p>
+            <a:pPr marL="0" lvl="0" indent="0" algn="ctr" rtl="0">
+              <a:lnSpc>
+                <a:spcPct val="100000"/>
+              </a:lnSpc>
+              <a:spcBef>
+                <a:spcPts val="0"/>
+              </a:spcBef>
+              <a:spcAft>
+                <a:spcPts val="0"/>
+              </a:spcAft>
+              <a:buSzPts val="5200"/>
+              <a:buNone/>
+            </a:pPr>
+            <a:endParaRPr sz="2400" b="1" dirty="0">
+              <a:solidFill>
+                <a:schemeClr val="lt1"/>
+              </a:solidFill>
+              <a:latin typeface="Montserrat"/>
+              <a:ea typeface="Montserrat"/>
+              <a:cs typeface="Montserrat"/>
+              <a:sym typeface="Montserrat"/>
+            </a:endParaRPr>
+          </a:p>
+          <a:p>
+            <a:pPr marL="0" lvl="0" indent="0" algn="ctr" rtl="0">
+              <a:spcBef>
+                <a:spcPts val="0"/>
+              </a:spcBef>
+              <a:spcAft>
+                <a:spcPts val="0"/>
+              </a:spcAft>
+              <a:buSzPts val="5200"/>
+              <a:buNone/>
+            </a:pPr>
+            <a:endParaRPr sz="2400" b="1" dirty="0">
+              <a:solidFill>
+                <a:schemeClr val="lt1"/>
+              </a:solidFill>
+              <a:latin typeface="Montserrat"/>
+              <a:ea typeface="Montserrat"/>
+              <a:cs typeface="Montserrat"/>
+              <a:sym typeface="Montserrat"/>
+            </a:endParaRPr>
+          </a:p>
+          <a:p>
+            <a:pPr marL="0" lvl="0" indent="0" algn="ctr" rtl="0">
+              <a:spcBef>
+                <a:spcPts val="0"/>
+              </a:spcBef>
+              <a:spcAft>
+                <a:spcPts val="0"/>
+              </a:spcAft>
+              <a:buSzPts val="5200"/>
+              <a:buNone/>
+            </a:pPr>
+            <a:r>
+              <a:rPr lang="en-US" sz="2400" b="1" dirty="0">
+                <a:solidFill>
+                  <a:schemeClr val="tx1"/>
+                </a:solidFill>
+                <a:latin typeface="Montserrat"/>
+                <a:ea typeface="Montserrat"/>
+                <a:cs typeface="Montserrat"/>
+                <a:sym typeface="Montserrat"/>
+              </a:rPr>
+              <a:t>Area Code Based Analysis</a:t>
+            </a:r>
+            <a:endParaRPr sz="2400" b="1" dirty="0">
+              <a:solidFill>
+                <a:schemeClr val="tx1"/>
+              </a:solidFill>
+              <a:latin typeface="Montserrat"/>
+              <a:ea typeface="Montserrat"/>
+              <a:cs typeface="Montserrat"/>
+              <a:sym typeface="Montserrat"/>
+            </a:endParaRPr>
+          </a:p>
+        </p:txBody>
+      </p:sp>
+      <p:sp>
+        <p:nvSpPr>
+          <p:cNvPr id="2" name="Text Placeholder 1">
+            <a:extLst>
+              <a:ext uri="{FF2B5EF4-FFF2-40B4-BE49-F238E27FC236}">
+                <a16:creationId xmlns:a16="http://schemas.microsoft.com/office/drawing/2014/main" id="{F46FBC8D-B97E-02F6-4661-E3112A5929A9}"/>
+              </a:ext>
+            </a:extLst>
+          </p:cNvPr>
+          <p:cNvSpPr>
+            <a:spLocks noGrp="1"/>
+          </p:cNvSpPr>
+          <p:nvPr>
+            <p:ph type="body" idx="1"/>
+          </p:nvPr>
+        </p:nvSpPr>
+        <p:spPr/>
+        <p:txBody>
+          <a:bodyPr/>
+          <a:lstStyle/>
+          <a:p>
+            <a:pPr marL="114300" indent="0">
+              <a:buNone/>
+            </a:pPr>
+            <a:r>
+              <a:rPr lang="en-US" dirty="0">
+                <a:solidFill>
+                  <a:schemeClr val="accent3"/>
+                </a:solidFill>
+              </a:rPr>
+              <a:t>We figured out from Data that there are total 3 Area Codes(415,408,510) to which users belongs to. To make analysis easier we created a nested python dictionary of the following type:</a:t>
+            </a:r>
+          </a:p>
+          <a:p>
+            <a:pPr marL="114300" indent="0">
+              <a:buNone/>
+            </a:pPr>
+            <a:endParaRPr lang="en-US" dirty="0">
+              <a:solidFill>
+                <a:schemeClr val="accent3"/>
+              </a:solidFill>
+            </a:endParaRPr>
+          </a:p>
+          <a:p>
+            <a:pPr marL="114300" indent="0">
+              <a:buNone/>
+            </a:pPr>
+            <a:endParaRPr lang="en-IN" dirty="0">
+              <a:solidFill>
+                <a:schemeClr val="accent3"/>
+              </a:solidFill>
+            </a:endParaRPr>
+          </a:p>
+        </p:txBody>
+      </p:sp>
+      <p:pic>
+        <p:nvPicPr>
+          <p:cNvPr id="4" name="Picture 3">
+            <a:extLst>
+              <a:ext uri="{FF2B5EF4-FFF2-40B4-BE49-F238E27FC236}">
+                <a16:creationId xmlns:a16="http://schemas.microsoft.com/office/drawing/2014/main" id="{74A7098B-B9FC-670A-93C0-AEBE7E69D217}"/>
+              </a:ext>
+            </a:extLst>
+          </p:cNvPr>
+          <p:cNvPicPr>
+            <a:picLocks noChangeAspect="1"/>
+          </p:cNvPicPr>
+          <p:nvPr/>
+        </p:nvPicPr>
+        <p:blipFill>
+          <a:blip r:embed="rId3"/>
+          <a:stretch>
+            <a:fillRect/>
+          </a:stretch>
+        </p:blipFill>
+        <p:spPr>
+          <a:xfrm>
+            <a:off x="995680" y="2424333"/>
+            <a:ext cx="6915573" cy="2286198"/>
+          </a:xfrm>
+          <a:prstGeom prst="rect">
+            <a:avLst/>
+          </a:prstGeom>
+        </p:spPr>
+      </p:pic>
+    </p:spTree>
+    <p:extLst>
+      <p:ext uri="{BB962C8B-B14F-4D97-AF65-F5344CB8AC3E}">
+        <p14:creationId xmlns:p14="http://schemas.microsoft.com/office/powerpoint/2010/main" val="110860667"/>
+      </p:ext>
+    </p:extLst>
+  </p:cSld>
+  <p:clrMapOvr>
+    <a:masterClrMapping/>
+  </p:clrMapOvr>
+</p:sld>
+</file>
+
+<file path=ppt/slides/slide11.xml><?xml version="1.0" encoding="utf-8"?>
+<p:sld xmlns:a="http://schemas.openxmlformats.org/drawingml/2006/main" xmlns:r="http://schemas.openxmlformats.org/officeDocument/2006/relationships" xmlns:p="http://schemas.openxmlformats.org/presentationml/2006/main">
+  <p:cSld>
+    <p:spTree>
+      <p:nvGrpSpPr>
+        <p:cNvPr id="1" name="Shape 59"/>
+        <p:cNvGrpSpPr/>
+        <p:nvPr/>
+      </p:nvGrpSpPr>
+      <p:grpSpPr>
+        <a:xfrm>
+          <a:off x="0" y="0"/>
+          <a:ext cx="0" cy="0"/>
+          <a:chOff x="0" y="0"/>
+          <a:chExt cx="0" cy="0"/>
+        </a:xfrm>
+      </p:grpSpPr>
+      <p:sp>
+        <p:nvSpPr>
+          <p:cNvPr id="60" name="Google Shape;60;p14"/>
+          <p:cNvSpPr txBox="1">
+            <a:spLocks noGrp="1"/>
+          </p:cNvSpPr>
+          <p:nvPr>
+            <p:ph type="title"/>
+          </p:nvPr>
+        </p:nvSpPr>
+        <p:spPr>
           <a:xfrm>
             <a:off x="311700" y="101600"/>
             <a:ext cx="8520600" cy="650240"/>
@@ -11325,7 +11697,7 @@
 </p:sld>
 </file>
 
-<file path=ppt/slides/slide11.xml><?xml version="1.0" encoding="utf-8"?>
+<file path=ppt/slides/slide12.xml><?xml version="1.0" encoding="utf-8"?>
 <p:sld xmlns:a="http://schemas.openxmlformats.org/drawingml/2006/main" xmlns:r="http://schemas.openxmlformats.org/officeDocument/2006/relationships" xmlns:p="http://schemas.openxmlformats.org/presentationml/2006/main">
   <p:cSld>
     <p:spTree>
@@ -11573,7 +11945,7 @@
 </p:sld>
 </file>
 
-<file path=ppt/slides/slide12.xml><?xml version="1.0" encoding="utf-8"?>
+<file path=ppt/slides/slide13.xml><?xml version="1.0" encoding="utf-8"?>
 <p:sld xmlns:a="http://schemas.openxmlformats.org/drawingml/2006/main" xmlns:r="http://schemas.openxmlformats.org/officeDocument/2006/relationships" xmlns:p="http://schemas.openxmlformats.org/presentationml/2006/main">
   <p:cSld>
     <p:spTree>
@@ -11821,7 +12193,7 @@
 </p:sld>
 </file>
 
-<file path=ppt/slides/slide13.xml><?xml version="1.0" encoding="utf-8"?>
+<file path=ppt/slides/slide14.xml><?xml version="1.0" encoding="utf-8"?>
 <p:sld xmlns:a="http://schemas.openxmlformats.org/drawingml/2006/main" xmlns:r="http://schemas.openxmlformats.org/officeDocument/2006/relationships" xmlns:p="http://schemas.openxmlformats.org/presentationml/2006/main">
   <p:cSld>
     <p:spTree>
@@ -12189,7 +12561,7 @@
 </p:sld>
 </file>
 
-<file path=ppt/slides/slide14.xml><?xml version="1.0" encoding="utf-8"?>
+<file path=ppt/slides/slide15.xml><?xml version="1.0" encoding="utf-8"?>
 <p:sld xmlns:a="http://schemas.openxmlformats.org/drawingml/2006/main" xmlns:r="http://schemas.openxmlformats.org/officeDocument/2006/relationships" xmlns:p="http://schemas.openxmlformats.org/presentationml/2006/main">
   <p:cSld>
     <p:spTree>
@@ -12407,7 +12779,7 @@
 </p:sld>
 </file>
 
-<file path=ppt/slides/slide15.xml><?xml version="1.0" encoding="utf-8"?>
+<file path=ppt/slides/slide16.xml><?xml version="1.0" encoding="utf-8"?>
 <p:sld xmlns:a="http://schemas.openxmlformats.org/drawingml/2006/main" xmlns:r="http://schemas.openxmlformats.org/officeDocument/2006/relationships" xmlns:p="http://schemas.openxmlformats.org/presentationml/2006/main">
   <p:cSld>
     <p:spTree>
@@ -12625,7 +12997,7 @@
 </p:sld>
 </file>
 
-<file path=ppt/slides/slide16.xml><?xml version="1.0" encoding="utf-8"?>
+<file path=ppt/slides/slide17.xml><?xml version="1.0" encoding="utf-8"?>
 <p:sld xmlns:a="http://schemas.openxmlformats.org/drawingml/2006/main" xmlns:r="http://schemas.openxmlformats.org/officeDocument/2006/relationships" xmlns:p="http://schemas.openxmlformats.org/presentationml/2006/main">
   <p:cSld>
     <p:spTree>
@@ -12671,6 +13043,140 @@
           </a:p>
         </p:txBody>
       </p:sp>
+      <p:pic>
+        <p:nvPicPr>
+          <p:cNvPr id="4" name="Picture 3">
+            <a:extLst>
+              <a:ext uri="{FF2B5EF4-FFF2-40B4-BE49-F238E27FC236}">
+                <a16:creationId xmlns:a16="http://schemas.microsoft.com/office/drawing/2014/main" id="{55CFA62E-B329-D7DC-585F-4EA239B5A1B2}"/>
+              </a:ext>
+            </a:extLst>
+          </p:cNvPr>
+          <p:cNvPicPr>
+            <a:picLocks noChangeAspect="1"/>
+          </p:cNvPicPr>
+          <p:nvPr/>
+        </p:nvPicPr>
+        <p:blipFill>
+          <a:blip r:embed="rId2"/>
+          <a:stretch>
+            <a:fillRect/>
+          </a:stretch>
+        </p:blipFill>
+        <p:spPr>
+          <a:xfrm>
+            <a:off x="57462" y="1111034"/>
+            <a:ext cx="4128476" cy="2771432"/>
+          </a:xfrm>
+          <a:prstGeom prst="rect">
+            <a:avLst/>
+          </a:prstGeom>
+        </p:spPr>
+      </p:pic>
+      <p:pic>
+        <p:nvPicPr>
+          <p:cNvPr id="6" name="Picture 5">
+            <a:extLst>
+              <a:ext uri="{FF2B5EF4-FFF2-40B4-BE49-F238E27FC236}">
+                <a16:creationId xmlns:a16="http://schemas.microsoft.com/office/drawing/2014/main" id="{2895934F-1806-F94A-92AB-B34F59F8DB64}"/>
+              </a:ext>
+            </a:extLst>
+          </p:cNvPr>
+          <p:cNvPicPr>
+            <a:picLocks noChangeAspect="1"/>
+          </p:cNvPicPr>
+          <p:nvPr/>
+        </p:nvPicPr>
+        <p:blipFill>
+          <a:blip r:embed="rId3"/>
+          <a:stretch>
+            <a:fillRect/>
+          </a:stretch>
+        </p:blipFill>
+        <p:spPr>
+          <a:xfrm>
+            <a:off x="4632962" y="1017725"/>
+            <a:ext cx="4477173" cy="2864741"/>
+          </a:xfrm>
+          <a:prstGeom prst="rect">
+            <a:avLst/>
+          </a:prstGeom>
+        </p:spPr>
+      </p:pic>
+      <p:sp>
+        <p:nvSpPr>
+          <p:cNvPr id="7" name="TextBox 6">
+            <a:extLst>
+              <a:ext uri="{FF2B5EF4-FFF2-40B4-BE49-F238E27FC236}">
+                <a16:creationId xmlns:a16="http://schemas.microsoft.com/office/drawing/2014/main" id="{FAB9219C-A1EB-9CEC-3362-72E2ED8C839E}"/>
+              </a:ext>
+            </a:extLst>
+          </p:cNvPr>
+          <p:cNvSpPr txBox="1"/>
+          <p:nvPr/>
+        </p:nvSpPr>
+        <p:spPr>
+          <a:xfrm flipH="1">
+            <a:off x="526879" y="4246680"/>
+            <a:ext cx="3157814" cy="307777"/>
+          </a:xfrm>
+          <a:prstGeom prst="rect">
+            <a:avLst/>
+          </a:prstGeom>
+          <a:noFill/>
+        </p:spPr>
+        <p:txBody>
+          <a:bodyPr wrap="square" rtlCol="0">
+            <a:spAutoFit/>
+          </a:bodyPr>
+          <a:lstStyle/>
+          <a:p>
+            <a:pPr algn="ctr"/>
+            <a:r>
+              <a:rPr lang="en-US" dirty="0"/>
+              <a:t>Churned Users</a:t>
+            </a:r>
+            <a:endParaRPr lang="en-IN" dirty="0"/>
+          </a:p>
+        </p:txBody>
+      </p:sp>
+      <p:sp>
+        <p:nvSpPr>
+          <p:cNvPr id="8" name="TextBox 7">
+            <a:extLst>
+              <a:ext uri="{FF2B5EF4-FFF2-40B4-BE49-F238E27FC236}">
+                <a16:creationId xmlns:a16="http://schemas.microsoft.com/office/drawing/2014/main" id="{AD09F8B9-6F13-167F-B7DA-27178EDE4340}"/>
+              </a:ext>
+            </a:extLst>
+          </p:cNvPr>
+          <p:cNvSpPr txBox="1"/>
+          <p:nvPr/>
+        </p:nvSpPr>
+        <p:spPr>
+          <a:xfrm flipH="1">
+            <a:off x="5440913" y="4256845"/>
+            <a:ext cx="3157814" cy="307777"/>
+          </a:xfrm>
+          <a:prstGeom prst="rect">
+            <a:avLst/>
+          </a:prstGeom>
+          <a:noFill/>
+        </p:spPr>
+        <p:txBody>
+          <a:bodyPr wrap="square" rtlCol="0">
+            <a:spAutoFit/>
+          </a:bodyPr>
+          <a:lstStyle/>
+          <a:p>
+            <a:pPr algn="ctr"/>
+            <a:r>
+              <a:rPr lang="en-US" dirty="0"/>
+              <a:t>Non Churned Users</a:t>
+            </a:r>
+            <a:endParaRPr lang="en-IN" dirty="0"/>
+          </a:p>
+        </p:txBody>
+      </p:sp>
     </p:spTree>
     <p:extLst>
       <p:ext uri="{BB962C8B-B14F-4D97-AF65-F5344CB8AC3E}">
@@ -12684,7 +13190,7 @@
 </p:sld>
 </file>
 
-<file path=ppt/slides/slide17.xml><?xml version="1.0" encoding="utf-8"?>
+<file path=ppt/slides/slide18.xml><?xml version="1.0" encoding="utf-8"?>
 <p:sld xmlns:a="http://schemas.openxmlformats.org/drawingml/2006/main" xmlns:r="http://schemas.openxmlformats.org/officeDocument/2006/relationships" xmlns:p="http://schemas.openxmlformats.org/presentationml/2006/main">
   <p:cSld>
     <p:spTree>
@@ -12954,7 +13460,7 @@
 </p:sld>
 </file>
 
-<file path=ppt/slides/slide18.xml><?xml version="1.0" encoding="utf-8"?>
+<file path=ppt/slides/slide19.xml><?xml version="1.0" encoding="utf-8"?>
 <p:sld xmlns:a="http://schemas.openxmlformats.org/drawingml/2006/main" xmlns:r="http://schemas.openxmlformats.org/officeDocument/2006/relationships" xmlns:p="http://schemas.openxmlformats.org/presentationml/2006/main">
   <p:cSld>
     <p:spTree>
@@ -12978,13 +13484,13 @@
             <a:spLocks noGrp="1"/>
           </p:cNvSpPr>
           <p:nvPr>
-            <p:ph type="ctrTitle"/>
+            <p:ph type="title"/>
           </p:nvPr>
         </p:nvSpPr>
         <p:spPr>
           <a:xfrm>
-            <a:off x="315750" y="2120054"/>
-            <a:ext cx="8512500" cy="839894"/>
+            <a:off x="311700" y="94827"/>
+            <a:ext cx="8520600" cy="1104053"/>
           </a:xfrm>
           <a:prstGeom prst="rect">
             <a:avLst/>
@@ -13000,7 +13506,7 @@
           </a:bodyPr>
           <a:lstStyle/>
           <a:p>
-            <a:pPr marL="0" lvl="0" indent="0" algn="l" rtl="0">
+            <a:pPr marL="0" lvl="0" indent="0" rtl="0">
               <a:lnSpc>
                 <a:spcPct val="100000"/>
               </a:lnSpc>
@@ -13013,7 +13519,19 @@
               <a:buSzPts val="5200"/>
               <a:buNone/>
             </a:pPr>
-            <a:endParaRPr sz="3200" b="1" dirty="0">
+            <a:r>
+              <a:rPr lang="en-IN" b="1" dirty="0">
+                <a:solidFill>
+                  <a:schemeClr val="tx1"/>
+                </a:solidFill>
+                <a:latin typeface="Montserrat"/>
+                <a:ea typeface="Montserrat"/>
+                <a:cs typeface="Montserrat"/>
+                <a:sym typeface="Montserrat"/>
+              </a:rPr>
+              <a:t>References</a:t>
+            </a:r>
+            <a:endParaRPr b="1" dirty="0">
               <a:solidFill>
                 <a:schemeClr val="tx1"/>
               </a:solidFill>
@@ -13023,90 +13541,90 @@
               <a:sym typeface="Montserrat"/>
             </a:endParaRPr>
           </a:p>
-          <a:p>
-            <a:pPr marL="0" lvl="0" indent="0" algn="ctr" rtl="0">
-              <a:lnSpc>
-                <a:spcPct val="100000"/>
-              </a:lnSpc>
-              <a:spcBef>
-                <a:spcPts val="0"/>
-              </a:spcBef>
-              <a:spcAft>
-                <a:spcPts val="0"/>
-              </a:spcAft>
-              <a:buSzPts val="5200"/>
-              <a:buNone/>
-            </a:pPr>
-            <a:endParaRPr sz="3200" b="1" dirty="0">
-              <a:solidFill>
-                <a:schemeClr val="tx1"/>
-              </a:solidFill>
-              <a:latin typeface="Montserrat"/>
-              <a:ea typeface="Montserrat"/>
-              <a:cs typeface="Montserrat"/>
-              <a:sym typeface="Montserrat"/>
-            </a:endParaRPr>
-          </a:p>
-          <a:p>
-            <a:pPr marL="0" lvl="0" indent="0" algn="ctr" rtl="0">
-              <a:spcBef>
-                <a:spcPts val="0"/>
-              </a:spcBef>
-              <a:spcAft>
-                <a:spcPts val="0"/>
-              </a:spcAft>
-              <a:buSzPts val="5200"/>
-              <a:buNone/>
+        </p:txBody>
+      </p:sp>
+      <p:sp>
+        <p:nvSpPr>
+          <p:cNvPr id="2" name="Text Placeholder 1">
+            <a:extLst>
+              <a:ext uri="{FF2B5EF4-FFF2-40B4-BE49-F238E27FC236}">
+                <a16:creationId xmlns:a16="http://schemas.microsoft.com/office/drawing/2014/main" id="{5D2058AE-F000-E5BB-10EA-7E7094784C9D}"/>
+              </a:ext>
+            </a:extLst>
+          </p:cNvPr>
+          <p:cNvSpPr>
+            <a:spLocks noGrp="1"/>
+          </p:cNvSpPr>
+          <p:nvPr>
+            <p:ph type="body" idx="1"/>
+          </p:nvPr>
+        </p:nvSpPr>
+        <p:spPr>
+          <a:xfrm>
+            <a:off x="311700" y="1652693"/>
+            <a:ext cx="8520600" cy="1584960"/>
+          </a:xfrm>
+        </p:spPr>
+        <p:txBody>
+          <a:bodyPr/>
+          <a:lstStyle/>
+          <a:p>
+            <a:pPr>
+              <a:buClr>
+                <a:schemeClr val="accent3"/>
+              </a:buClr>
+              <a:buFont typeface="Arial" panose="020B0604020202020204" pitchFamily="34" charset="0"/>
+              <a:buChar char="•"/>
             </a:pPr>
             <a:r>
-              <a:rPr lang="en-US" sz="3200" b="1" dirty="0">
-                <a:solidFill>
-                  <a:schemeClr val="tx1"/>
-                </a:solidFill>
-                <a:latin typeface="Montserrat"/>
-                <a:ea typeface="Montserrat"/>
-                <a:cs typeface="Montserrat"/>
-                <a:sym typeface="Montserrat"/>
+              <a:rPr lang="en-IN" sz="2200" dirty="0">
+                <a:solidFill>
+                  <a:schemeClr val="accent3"/>
+                </a:solidFill>
               </a:rPr>
-              <a:t>THANK YOU</a:t>
+              <a:t>Numpy, Pandas, Matplotlib and Seaborn documentation.</a:t>
             </a:r>
-            <a:endParaRPr sz="3200" b="1" dirty="0">
-              <a:solidFill>
-                <a:schemeClr val="tx1"/>
-              </a:solidFill>
-              <a:latin typeface="Montserrat"/>
-              <a:ea typeface="Montserrat"/>
-              <a:cs typeface="Montserrat"/>
-              <a:sym typeface="Montserrat"/>
-            </a:endParaRPr>
-          </a:p>
-          <a:p>
-            <a:pPr marL="0" lvl="0" indent="0" algn="ctr" rtl="0">
-              <a:spcBef>
-                <a:spcPts val="0"/>
-              </a:spcBef>
-              <a:spcAft>
-                <a:spcPts val="0"/>
-              </a:spcAft>
-              <a:buSzPts val="5200"/>
-              <a:buNone/>
+          </a:p>
+          <a:p>
+            <a:pPr>
+              <a:buClr>
+                <a:schemeClr val="accent3"/>
+              </a:buClr>
+              <a:buFont typeface="Arial" panose="020B0604020202020204" pitchFamily="34" charset="0"/>
+              <a:buChar char="•"/>
             </a:pPr>
-            <a:endParaRPr sz="3200" b="1" dirty="0">
-              <a:solidFill>
-                <a:schemeClr val="tx1"/>
-              </a:solidFill>
-              <a:latin typeface="Montserrat"/>
-              <a:ea typeface="Montserrat"/>
-              <a:cs typeface="Montserrat"/>
-              <a:sym typeface="Montserrat"/>
-            </a:endParaRPr>
+            <a:r>
+              <a:rPr lang="en-IN" sz="2200" dirty="0">
+                <a:solidFill>
+                  <a:schemeClr val="accent3"/>
+                </a:solidFill>
+              </a:rPr>
+              <a:t>Alma Better Recorded Classes.</a:t>
+            </a:r>
+          </a:p>
+          <a:p>
+            <a:pPr>
+              <a:buClr>
+                <a:schemeClr val="accent3"/>
+              </a:buClr>
+              <a:buFont typeface="Arial" panose="020B0604020202020204" pitchFamily="34" charset="0"/>
+              <a:buChar char="•"/>
+            </a:pPr>
+            <a:r>
+              <a:rPr lang="en-IN" sz="2200" dirty="0">
+                <a:solidFill>
+                  <a:schemeClr val="accent3"/>
+                </a:solidFill>
+              </a:rPr>
+              <a:t>Articles on Towards Data Science</a:t>
+            </a:r>
           </a:p>
         </p:txBody>
       </p:sp>
     </p:spTree>
     <p:extLst>
       <p:ext uri="{BB962C8B-B14F-4D97-AF65-F5344CB8AC3E}">
-        <p14:creationId xmlns:p14="http://schemas.microsoft.com/office/powerpoint/2010/main" val="2746993976"/>
+        <p14:creationId xmlns:p14="http://schemas.microsoft.com/office/powerpoint/2010/main" val="2741789666"/>
       </p:ext>
     </p:extLst>
   </p:cSld>
@@ -13294,6 +13812,168 @@
         </p:txBody>
       </p:sp>
     </p:spTree>
+  </p:cSld>
+  <p:clrMapOvr>
+    <a:masterClrMapping/>
+  </p:clrMapOvr>
+</p:sld>
+</file>
+
+<file path=ppt/slides/slide20.xml><?xml version="1.0" encoding="utf-8"?>
+<p:sld xmlns:a="http://schemas.openxmlformats.org/drawingml/2006/main" xmlns:r="http://schemas.openxmlformats.org/officeDocument/2006/relationships" xmlns:p="http://schemas.openxmlformats.org/presentationml/2006/main">
+  <p:cSld>
+    <p:spTree>
+      <p:nvGrpSpPr>
+        <p:cNvPr id="1" name="Shape 59"/>
+        <p:cNvGrpSpPr/>
+        <p:nvPr/>
+      </p:nvGrpSpPr>
+      <p:grpSpPr>
+        <a:xfrm>
+          <a:off x="0" y="0"/>
+          <a:ext cx="0" cy="0"/>
+          <a:chOff x="0" y="0"/>
+          <a:chExt cx="0" cy="0"/>
+        </a:xfrm>
+      </p:grpSpPr>
+      <p:sp>
+        <p:nvSpPr>
+          <p:cNvPr id="60" name="Google Shape;60;p14"/>
+          <p:cNvSpPr txBox="1">
+            <a:spLocks noGrp="1"/>
+          </p:cNvSpPr>
+          <p:nvPr>
+            <p:ph type="ctrTitle"/>
+          </p:nvPr>
+        </p:nvSpPr>
+        <p:spPr>
+          <a:xfrm>
+            <a:off x="315750" y="2120054"/>
+            <a:ext cx="8512500" cy="839894"/>
+          </a:xfrm>
+          <a:prstGeom prst="rect">
+            <a:avLst/>
+          </a:prstGeom>
+          <a:noFill/>
+          <a:ln>
+            <a:noFill/>
+          </a:ln>
+        </p:spPr>
+        <p:txBody>
+          <a:bodyPr spcFirstLastPara="1" wrap="square" lIns="91425" tIns="91425" rIns="91425" bIns="91425" anchor="b" anchorCtr="0">
+            <a:noAutofit/>
+          </a:bodyPr>
+          <a:lstStyle/>
+          <a:p>
+            <a:pPr marL="0" lvl="0" indent="0" algn="l" rtl="0">
+              <a:lnSpc>
+                <a:spcPct val="100000"/>
+              </a:lnSpc>
+              <a:spcBef>
+                <a:spcPts val="0"/>
+              </a:spcBef>
+              <a:spcAft>
+                <a:spcPts val="0"/>
+              </a:spcAft>
+              <a:buSzPts val="5200"/>
+              <a:buNone/>
+            </a:pPr>
+            <a:endParaRPr sz="3200" b="1" dirty="0">
+              <a:solidFill>
+                <a:schemeClr val="tx1"/>
+              </a:solidFill>
+              <a:latin typeface="Montserrat"/>
+              <a:ea typeface="Montserrat"/>
+              <a:cs typeface="Montserrat"/>
+              <a:sym typeface="Montserrat"/>
+            </a:endParaRPr>
+          </a:p>
+          <a:p>
+            <a:pPr marL="0" lvl="0" indent="0" algn="ctr" rtl="0">
+              <a:lnSpc>
+                <a:spcPct val="100000"/>
+              </a:lnSpc>
+              <a:spcBef>
+                <a:spcPts val="0"/>
+              </a:spcBef>
+              <a:spcAft>
+                <a:spcPts val="0"/>
+              </a:spcAft>
+              <a:buSzPts val="5200"/>
+              <a:buNone/>
+            </a:pPr>
+            <a:endParaRPr sz="3200" b="1" dirty="0">
+              <a:solidFill>
+                <a:schemeClr val="tx1"/>
+              </a:solidFill>
+              <a:latin typeface="Montserrat"/>
+              <a:ea typeface="Montserrat"/>
+              <a:cs typeface="Montserrat"/>
+              <a:sym typeface="Montserrat"/>
+            </a:endParaRPr>
+          </a:p>
+          <a:p>
+            <a:pPr marL="0" lvl="0" indent="0" algn="ctr" rtl="0">
+              <a:spcBef>
+                <a:spcPts val="0"/>
+              </a:spcBef>
+              <a:spcAft>
+                <a:spcPts val="0"/>
+              </a:spcAft>
+              <a:buSzPts val="5200"/>
+              <a:buNone/>
+            </a:pPr>
+            <a:r>
+              <a:rPr lang="en-US" sz="3200" b="1" dirty="0">
+                <a:solidFill>
+                  <a:schemeClr val="tx1"/>
+                </a:solidFill>
+                <a:latin typeface="Montserrat"/>
+                <a:ea typeface="Montserrat"/>
+                <a:cs typeface="Montserrat"/>
+                <a:sym typeface="Montserrat"/>
+              </a:rPr>
+              <a:t>THANK YOU</a:t>
+            </a:r>
+            <a:endParaRPr sz="3200" b="1" dirty="0">
+              <a:solidFill>
+                <a:schemeClr val="tx1"/>
+              </a:solidFill>
+              <a:latin typeface="Montserrat"/>
+              <a:ea typeface="Montserrat"/>
+              <a:cs typeface="Montserrat"/>
+              <a:sym typeface="Montserrat"/>
+            </a:endParaRPr>
+          </a:p>
+          <a:p>
+            <a:pPr marL="0" lvl="0" indent="0" algn="ctr" rtl="0">
+              <a:spcBef>
+                <a:spcPts val="0"/>
+              </a:spcBef>
+              <a:spcAft>
+                <a:spcPts val="0"/>
+              </a:spcAft>
+              <a:buSzPts val="5200"/>
+              <a:buNone/>
+            </a:pPr>
+            <a:endParaRPr sz="3200" b="1" dirty="0">
+              <a:solidFill>
+                <a:schemeClr val="tx1"/>
+              </a:solidFill>
+              <a:latin typeface="Montserrat"/>
+              <a:ea typeface="Montserrat"/>
+              <a:cs typeface="Montserrat"/>
+              <a:sym typeface="Montserrat"/>
+            </a:endParaRPr>
+          </a:p>
+        </p:txBody>
+      </p:sp>
+    </p:spTree>
+    <p:extLst>
+      <p:ext uri="{BB962C8B-B14F-4D97-AF65-F5344CB8AC3E}">
+        <p14:creationId xmlns:p14="http://schemas.microsoft.com/office/powerpoint/2010/main" val="2746993976"/>
+      </p:ext>
+    </p:extLst>
   </p:cSld>
   <p:clrMapOvr>
     <a:masterClrMapping/>
@@ -14320,7 +15000,7 @@
   <p:cSld>
     <p:spTree>
       <p:nvGrpSpPr>
-        <p:cNvPr id="1" name="Shape 59"/>
+        <p:cNvPr id="1" name=""/>
         <p:cNvGrpSpPr/>
         <p:nvPr/>
       </p:nvGrpSpPr>
@@ -14334,8 +15014,14 @@
       </p:grpSpPr>
       <p:sp>
         <p:nvSpPr>
-          <p:cNvPr id="60" name="Google Shape;60;p14"/>
-          <p:cNvSpPr txBox="1">
+          <p:cNvPr id="2" name="Title 1">
+            <a:extLst>
+              <a:ext uri="{FF2B5EF4-FFF2-40B4-BE49-F238E27FC236}">
+                <a16:creationId xmlns:a16="http://schemas.microsoft.com/office/drawing/2014/main" id="{0A8EB363-09E1-9F39-A088-85A1487F281A}"/>
+              </a:ext>
+            </a:extLst>
+          </p:cNvPr>
+          <p:cNvSpPr>
             <a:spLocks noGrp="1"/>
           </p:cNvSpPr>
           <p:nvPr>
@@ -14344,155 +15030,27 @@
         </p:nvSpPr>
         <p:spPr>
           <a:xfrm>
-            <a:off x="311700" y="-128693"/>
-            <a:ext cx="8520600" cy="819573"/>
+            <a:off x="311700" y="0"/>
+            <a:ext cx="8520600" cy="574625"/>
           </a:xfrm>
-          <a:prstGeom prst="rect">
-            <a:avLst/>
-          </a:prstGeom>
-          <a:noFill/>
-          <a:ln>
-            <a:noFill/>
-          </a:ln>
         </p:spPr>
         <p:txBody>
-          <a:bodyPr spcFirstLastPara="1" wrap="square" lIns="91425" tIns="91425" rIns="91425" bIns="91425" anchor="b" anchorCtr="0">
-            <a:noAutofit/>
-          </a:bodyPr>
+          <a:bodyPr/>
           <a:lstStyle/>
           <a:p>
-            <a:pPr marL="0" lvl="0" indent="0" algn="l" rtl="0">
-              <a:lnSpc>
-                <a:spcPct val="100000"/>
-              </a:lnSpc>
-              <a:spcBef>
-                <a:spcPts val="0"/>
-              </a:spcBef>
-              <a:spcAft>
-                <a:spcPts val="0"/>
-              </a:spcAft>
-              <a:buSzPts val="5200"/>
-              <a:buNone/>
-            </a:pPr>
-            <a:endParaRPr sz="3600" b="1" dirty="0">
-              <a:solidFill>
-                <a:schemeClr val="tx1"/>
-              </a:solidFill>
-              <a:latin typeface="Montserrat"/>
-              <a:ea typeface="Montserrat"/>
-              <a:cs typeface="Montserrat"/>
-              <a:sym typeface="Montserrat"/>
-            </a:endParaRPr>
-          </a:p>
-          <a:p>
-            <a:pPr marL="0" lvl="0" indent="0" algn="ctr" rtl="0">
-              <a:lnSpc>
-                <a:spcPct val="100000"/>
-              </a:lnSpc>
-              <a:spcBef>
-                <a:spcPts val="0"/>
-              </a:spcBef>
-              <a:spcAft>
-                <a:spcPts val="0"/>
-              </a:spcAft>
-              <a:buSzPts val="5200"/>
-              <a:buNone/>
-            </a:pPr>
-            <a:endParaRPr sz="3600" b="1" dirty="0">
-              <a:solidFill>
-                <a:schemeClr val="tx1"/>
-              </a:solidFill>
-              <a:latin typeface="Montserrat"/>
-              <a:ea typeface="Montserrat"/>
-              <a:cs typeface="Montserrat"/>
-              <a:sym typeface="Montserrat"/>
-            </a:endParaRPr>
-          </a:p>
-          <a:p>
-            <a:pPr marL="0" lvl="0" indent="0" algn="ctr" rtl="0">
-              <a:spcBef>
-                <a:spcPts val="0"/>
-              </a:spcBef>
-              <a:spcAft>
-                <a:spcPts val="0"/>
-              </a:spcAft>
-              <a:buSzPts val="5200"/>
-              <a:buNone/>
-            </a:pPr>
-            <a:br>
-              <a:rPr lang="en-US" sz="1600" b="1" dirty="0">
-                <a:solidFill>
-                  <a:schemeClr val="tx1"/>
-                </a:solidFill>
-                <a:latin typeface="Montserrat"/>
-                <a:ea typeface="Montserrat"/>
-                <a:cs typeface="Montserrat"/>
-                <a:sym typeface="Montserrat"/>
-              </a:rPr>
-            </a:br>
-            <a:br>
-              <a:rPr lang="en-US" sz="1600" b="1" dirty="0">
-                <a:solidFill>
-                  <a:schemeClr val="tx1"/>
-                </a:solidFill>
-                <a:latin typeface="Montserrat"/>
-                <a:ea typeface="Montserrat"/>
-                <a:cs typeface="Montserrat"/>
-                <a:sym typeface="Montserrat"/>
-              </a:rPr>
-            </a:br>
-            <a:br>
-              <a:rPr lang="en-US" sz="1600" b="1" dirty="0">
-                <a:solidFill>
-                  <a:schemeClr val="tx1"/>
-                </a:solidFill>
-                <a:latin typeface="Montserrat"/>
-                <a:ea typeface="Montserrat"/>
-                <a:cs typeface="Montserrat"/>
-                <a:sym typeface="Montserrat"/>
-              </a:rPr>
-            </a:br>
-            <a:br>
-              <a:rPr lang="en-US" sz="1600" b="1" dirty="0">
-                <a:solidFill>
-                  <a:schemeClr val="tx1"/>
-                </a:solidFill>
-                <a:latin typeface="Montserrat"/>
-                <a:ea typeface="Montserrat"/>
-                <a:cs typeface="Montserrat"/>
-                <a:sym typeface="Montserrat"/>
-              </a:rPr>
-            </a:br>
             <a:r>
-              <a:rPr lang="en-US" sz="1600" b="1" dirty="0">
-                <a:solidFill>
-                  <a:schemeClr val="tx1"/>
-                </a:solidFill>
-                <a:latin typeface="Montserrat"/>
-                <a:ea typeface="Montserrat"/>
-                <a:cs typeface="Montserrat"/>
-                <a:sym typeface="Montserrat"/>
-              </a:rPr>
-              <a:t>Frequency Distribution(Histogram Plot) of Churned vs Non Churned Users based Total Minutes users used during day, evening and night </a:t>
+              <a:rPr lang="en-IN" b="1" dirty="0"/>
+              <a:t>Problem Statements</a:t>
             </a:r>
-            <a:endParaRPr sz="1600" b="1" dirty="0">
-              <a:solidFill>
-                <a:schemeClr val="tx1"/>
-              </a:solidFill>
-              <a:latin typeface="Montserrat"/>
-              <a:ea typeface="Montserrat"/>
-              <a:cs typeface="Montserrat"/>
-              <a:sym typeface="Montserrat"/>
-            </a:endParaRPr>
           </a:p>
         </p:txBody>
       </p:sp>
       <p:sp>
         <p:nvSpPr>
-          <p:cNvPr id="2" name="Text Placeholder 1">
+          <p:cNvPr id="3" name="Text Placeholder 2">
             <a:extLst>
               <a:ext uri="{FF2B5EF4-FFF2-40B4-BE49-F238E27FC236}">
-                <a16:creationId xmlns:a16="http://schemas.microsoft.com/office/drawing/2014/main" id="{0F91004C-85BE-15A3-331B-0290D744BAAD}"/>
+                <a16:creationId xmlns:a16="http://schemas.microsoft.com/office/drawing/2014/main" id="{FF7DC315-FA4A-37F0-5F61-DE3AEC887BE9}"/>
               </a:ext>
             </a:extLst>
           </p:cNvPr>
@@ -14505,52 +15063,138 @@
         </p:nvSpPr>
         <p:spPr>
           <a:xfrm>
-            <a:off x="311700" y="806027"/>
-            <a:ext cx="8520600" cy="3762848"/>
+            <a:off x="311700" y="684107"/>
+            <a:ext cx="8520600" cy="3884768"/>
           </a:xfrm>
         </p:spPr>
         <p:txBody>
           <a:bodyPr/>
           <a:lstStyle/>
           <a:p>
-            <a:endParaRPr lang="en-IN" dirty="0"/>
+            <a:pPr>
+              <a:buClr>
+                <a:schemeClr val="accent3"/>
+              </a:buClr>
+              <a:buFont typeface="Arial" panose="020B0604020202020204" pitchFamily="34" charset="0"/>
+              <a:buChar char="•"/>
+            </a:pPr>
+            <a:r>
+              <a:rPr lang="en-IN" sz="2200" dirty="0">
+                <a:solidFill>
+                  <a:schemeClr val="accent3"/>
+                </a:solidFill>
+              </a:rPr>
+              <a:t>Do Churned user speaking more during any specific duration (Day, Evening or night) compared to Non Churned ?</a:t>
+            </a:r>
+          </a:p>
+          <a:p>
+            <a:pPr>
+              <a:buClr>
+                <a:schemeClr val="accent3"/>
+              </a:buClr>
+              <a:buFont typeface="Arial" panose="020B0604020202020204" pitchFamily="34" charset="0"/>
+              <a:buChar char="•"/>
+            </a:pPr>
+            <a:r>
+              <a:rPr lang="en-IN" sz="2200" dirty="0">
+                <a:solidFill>
+                  <a:schemeClr val="accent3"/>
+                </a:solidFill>
+              </a:rPr>
+              <a:t>Does the user calls at particular duration has any impact on his calls of other durations ?</a:t>
+            </a:r>
+          </a:p>
+          <a:p>
+            <a:pPr>
+              <a:buClr>
+                <a:schemeClr val="accent3"/>
+              </a:buClr>
+              <a:buFont typeface="Arial" panose="020B0604020202020204" pitchFamily="34" charset="0"/>
+              <a:buChar char="•"/>
+            </a:pPr>
+            <a:r>
+              <a:rPr lang="en-IN" sz="2200" dirty="0">
+                <a:solidFill>
+                  <a:schemeClr val="accent3"/>
+                </a:solidFill>
+              </a:rPr>
+              <a:t>Do Area has any significant impact on Churned users ?</a:t>
+            </a:r>
+          </a:p>
+          <a:p>
+            <a:pPr>
+              <a:buClr>
+                <a:schemeClr val="accent3"/>
+              </a:buClr>
+              <a:buFont typeface="Arial" panose="020B0604020202020204" pitchFamily="34" charset="0"/>
+              <a:buChar char="•"/>
+            </a:pPr>
+            <a:r>
+              <a:rPr lang="en-IN" sz="2200" dirty="0">
+                <a:solidFill>
+                  <a:schemeClr val="accent3"/>
+                </a:solidFill>
+              </a:rPr>
+              <a:t>Do State has any impact on Churned users ?</a:t>
+            </a:r>
+          </a:p>
+          <a:p>
+            <a:pPr>
+              <a:buClr>
+                <a:schemeClr val="accent3"/>
+              </a:buClr>
+              <a:buFont typeface="Arial" panose="020B0604020202020204" pitchFamily="34" charset="0"/>
+              <a:buChar char="•"/>
+            </a:pPr>
+            <a:r>
+              <a:rPr lang="en-IN" sz="2200" dirty="0">
+                <a:solidFill>
+                  <a:schemeClr val="accent3"/>
+                </a:solidFill>
+              </a:rPr>
+              <a:t>Did opting for International plan resulted in Churning of users ?</a:t>
+            </a:r>
+          </a:p>
+          <a:p>
+            <a:pPr>
+              <a:buClr>
+                <a:schemeClr val="accent3"/>
+              </a:buClr>
+              <a:buFont typeface="Arial" panose="020B0604020202020204" pitchFamily="34" charset="0"/>
+              <a:buChar char="•"/>
+            </a:pPr>
+            <a:r>
+              <a:rPr lang="en-IN" sz="2200" dirty="0">
+                <a:solidFill>
+                  <a:schemeClr val="accent3"/>
+                </a:solidFill>
+              </a:rPr>
+              <a:t>Did opting for Voicemail plan resulted in Churning of Users ?</a:t>
+            </a:r>
+          </a:p>
+          <a:p>
+            <a:pPr>
+              <a:buClr>
+                <a:schemeClr val="accent3"/>
+              </a:buClr>
+              <a:buFont typeface="Arial" panose="020B0604020202020204" pitchFamily="34" charset="0"/>
+              <a:buChar char="•"/>
+            </a:pPr>
+            <a:r>
+              <a:rPr lang="en-IN" sz="2200" dirty="0">
+                <a:solidFill>
+                  <a:schemeClr val="accent3"/>
+                </a:solidFill>
+              </a:rPr>
+              <a:t>Did customers making more service calls churned more than those who didn’t ?</a:t>
+            </a:r>
           </a:p>
         </p:txBody>
       </p:sp>
-      <p:pic>
-        <p:nvPicPr>
-          <p:cNvPr id="4" name="Picture 3">
-            <a:extLst>
-              <a:ext uri="{FF2B5EF4-FFF2-40B4-BE49-F238E27FC236}">
-                <a16:creationId xmlns:a16="http://schemas.microsoft.com/office/drawing/2014/main" id="{EA5A248D-524C-A3C8-8EA2-2ABD64F60510}"/>
-              </a:ext>
-            </a:extLst>
-          </p:cNvPr>
-          <p:cNvPicPr>
-            <a:picLocks noChangeAspect="1"/>
-          </p:cNvPicPr>
-          <p:nvPr/>
-        </p:nvPicPr>
-        <p:blipFill>
-          <a:blip r:embed="rId3"/>
-          <a:stretch>
-            <a:fillRect/>
-          </a:stretch>
-        </p:blipFill>
-        <p:spPr>
-          <a:xfrm>
-            <a:off x="311700" y="806027"/>
-            <a:ext cx="8581687" cy="3826934"/>
-          </a:xfrm>
-          <a:prstGeom prst="rect">
-            <a:avLst/>
-          </a:prstGeom>
-        </p:spPr>
-      </p:pic>
     </p:spTree>
     <p:extLst>
       <p:ext uri="{BB962C8B-B14F-4D97-AF65-F5344CB8AC3E}">
-        <p14:creationId xmlns:p14="http://schemas.microsoft.com/office/powerpoint/2010/main" val="3726265342"/>
+        <p14:creationId xmlns:p14="http://schemas.microsoft.com/office/powerpoint/2010/main" val="582508031"/>
       </p:ext>
     </p:extLst>
   </p:cSld>
@@ -14718,7 +15362,7 @@
                 <a:cs typeface="Montserrat"/>
                 <a:sym typeface="Montserrat"/>
               </a:rPr>
-              <a:t>Frequency Distribution(Histogram Plot) of Churned vs Non Churned Users based Total calls users made used during day, evening and night </a:t>
+              <a:t>Frequency Distribution(Histogram Plot) of Churned vs Non Churned Users based Total Minutes users used during day, evening and night </a:t>
             </a:r>
             <a:endParaRPr sz="1600" b="1" dirty="0">
               <a:solidFill>
@@ -14764,10 +15408,10 @@
       </p:sp>
       <p:pic>
         <p:nvPicPr>
-          <p:cNvPr id="5" name="Picture 4">
+          <p:cNvPr id="4" name="Picture 3">
             <a:extLst>
               <a:ext uri="{FF2B5EF4-FFF2-40B4-BE49-F238E27FC236}">
-                <a16:creationId xmlns:a16="http://schemas.microsoft.com/office/drawing/2014/main" id="{BE2F431B-2C68-A902-99C3-947E7C607131}"/>
+                <a16:creationId xmlns:a16="http://schemas.microsoft.com/office/drawing/2014/main" id="{EA5A248D-524C-A3C8-8EA2-2ABD64F60510}"/>
               </a:ext>
             </a:extLst>
           </p:cNvPr>
@@ -14784,8 +15428,8 @@
         </p:blipFill>
         <p:spPr>
           <a:xfrm>
-            <a:off x="311699" y="806027"/>
-            <a:ext cx="8574913" cy="3762848"/>
+            <a:off x="311700" y="806027"/>
+            <a:ext cx="8581687" cy="3826934"/>
           </a:xfrm>
           <a:prstGeom prst="rect">
             <a:avLst/>
@@ -14795,7 +15439,7 @@
     </p:spTree>
     <p:extLst>
       <p:ext uri="{BB962C8B-B14F-4D97-AF65-F5344CB8AC3E}">
-        <p14:creationId xmlns:p14="http://schemas.microsoft.com/office/powerpoint/2010/main" val="1741922666"/>
+        <p14:creationId xmlns:p14="http://schemas.microsoft.com/office/powerpoint/2010/main" val="3726265342"/>
       </p:ext>
     </p:extLst>
   </p:cSld>
@@ -14963,6 +15607,251 @@
                 <a:cs typeface="Montserrat"/>
                 <a:sym typeface="Montserrat"/>
               </a:rPr>
+              <a:t>Frequency Distribution(Histogram Plot) of Churned vs Non Churned Users based Total calls users made used during day, evening and night </a:t>
+            </a:r>
+            <a:endParaRPr sz="1600" b="1" dirty="0">
+              <a:solidFill>
+                <a:schemeClr val="tx1"/>
+              </a:solidFill>
+              <a:latin typeface="Montserrat"/>
+              <a:ea typeface="Montserrat"/>
+              <a:cs typeface="Montserrat"/>
+              <a:sym typeface="Montserrat"/>
+            </a:endParaRPr>
+          </a:p>
+        </p:txBody>
+      </p:sp>
+      <p:sp>
+        <p:nvSpPr>
+          <p:cNvPr id="2" name="Text Placeholder 1">
+            <a:extLst>
+              <a:ext uri="{FF2B5EF4-FFF2-40B4-BE49-F238E27FC236}">
+                <a16:creationId xmlns:a16="http://schemas.microsoft.com/office/drawing/2014/main" id="{0F91004C-85BE-15A3-331B-0290D744BAAD}"/>
+              </a:ext>
+            </a:extLst>
+          </p:cNvPr>
+          <p:cNvSpPr>
+            <a:spLocks noGrp="1"/>
+          </p:cNvSpPr>
+          <p:nvPr>
+            <p:ph type="body" idx="1"/>
+          </p:nvPr>
+        </p:nvSpPr>
+        <p:spPr>
+          <a:xfrm>
+            <a:off x="311700" y="806027"/>
+            <a:ext cx="8520600" cy="3762848"/>
+          </a:xfrm>
+        </p:spPr>
+        <p:txBody>
+          <a:bodyPr/>
+          <a:lstStyle/>
+          <a:p>
+            <a:endParaRPr lang="en-IN" dirty="0"/>
+          </a:p>
+        </p:txBody>
+      </p:sp>
+      <p:pic>
+        <p:nvPicPr>
+          <p:cNvPr id="5" name="Picture 4">
+            <a:extLst>
+              <a:ext uri="{FF2B5EF4-FFF2-40B4-BE49-F238E27FC236}">
+                <a16:creationId xmlns:a16="http://schemas.microsoft.com/office/drawing/2014/main" id="{BE2F431B-2C68-A902-99C3-947E7C607131}"/>
+              </a:ext>
+            </a:extLst>
+          </p:cNvPr>
+          <p:cNvPicPr>
+            <a:picLocks noChangeAspect="1"/>
+          </p:cNvPicPr>
+          <p:nvPr/>
+        </p:nvPicPr>
+        <p:blipFill>
+          <a:blip r:embed="rId3"/>
+          <a:stretch>
+            <a:fillRect/>
+          </a:stretch>
+        </p:blipFill>
+        <p:spPr>
+          <a:xfrm>
+            <a:off x="311699" y="806027"/>
+            <a:ext cx="8574913" cy="3762848"/>
+          </a:xfrm>
+          <a:prstGeom prst="rect">
+            <a:avLst/>
+          </a:prstGeom>
+        </p:spPr>
+      </p:pic>
+    </p:spTree>
+    <p:extLst>
+      <p:ext uri="{BB962C8B-B14F-4D97-AF65-F5344CB8AC3E}">
+        <p14:creationId xmlns:p14="http://schemas.microsoft.com/office/powerpoint/2010/main" val="1741922666"/>
+      </p:ext>
+    </p:extLst>
+  </p:cSld>
+  <p:clrMapOvr>
+    <a:masterClrMapping/>
+  </p:clrMapOvr>
+</p:sld>
+</file>
+
+<file path=ppt/slides/slide8.xml><?xml version="1.0" encoding="utf-8"?>
+<p:sld xmlns:a="http://schemas.openxmlformats.org/drawingml/2006/main" xmlns:r="http://schemas.openxmlformats.org/officeDocument/2006/relationships" xmlns:p="http://schemas.openxmlformats.org/presentationml/2006/main">
+  <p:cSld>
+    <p:spTree>
+      <p:nvGrpSpPr>
+        <p:cNvPr id="1" name="Shape 59"/>
+        <p:cNvGrpSpPr/>
+        <p:nvPr/>
+      </p:nvGrpSpPr>
+      <p:grpSpPr>
+        <a:xfrm>
+          <a:off x="0" y="0"/>
+          <a:ext cx="0" cy="0"/>
+          <a:chOff x="0" y="0"/>
+          <a:chExt cx="0" cy="0"/>
+        </a:xfrm>
+      </p:grpSpPr>
+      <p:sp>
+        <p:nvSpPr>
+          <p:cNvPr id="60" name="Google Shape;60;p14"/>
+          <p:cNvSpPr txBox="1">
+            <a:spLocks noGrp="1"/>
+          </p:cNvSpPr>
+          <p:nvPr>
+            <p:ph type="title"/>
+          </p:nvPr>
+        </p:nvSpPr>
+        <p:spPr>
+          <a:xfrm>
+            <a:off x="311700" y="-128693"/>
+            <a:ext cx="8520600" cy="819573"/>
+          </a:xfrm>
+          <a:prstGeom prst="rect">
+            <a:avLst/>
+          </a:prstGeom>
+          <a:noFill/>
+          <a:ln>
+            <a:noFill/>
+          </a:ln>
+        </p:spPr>
+        <p:txBody>
+          <a:bodyPr spcFirstLastPara="1" wrap="square" lIns="91425" tIns="91425" rIns="91425" bIns="91425" anchor="b" anchorCtr="0">
+            <a:noAutofit/>
+          </a:bodyPr>
+          <a:lstStyle/>
+          <a:p>
+            <a:pPr marL="0" lvl="0" indent="0" algn="l" rtl="0">
+              <a:lnSpc>
+                <a:spcPct val="100000"/>
+              </a:lnSpc>
+              <a:spcBef>
+                <a:spcPts val="0"/>
+              </a:spcBef>
+              <a:spcAft>
+                <a:spcPts val="0"/>
+              </a:spcAft>
+              <a:buSzPts val="5200"/>
+              <a:buNone/>
+            </a:pPr>
+            <a:endParaRPr sz="3600" b="1" dirty="0">
+              <a:solidFill>
+                <a:schemeClr val="tx1"/>
+              </a:solidFill>
+              <a:latin typeface="Montserrat"/>
+              <a:ea typeface="Montserrat"/>
+              <a:cs typeface="Montserrat"/>
+              <a:sym typeface="Montserrat"/>
+            </a:endParaRPr>
+          </a:p>
+          <a:p>
+            <a:pPr marL="0" lvl="0" indent="0" algn="ctr" rtl="0">
+              <a:lnSpc>
+                <a:spcPct val="100000"/>
+              </a:lnSpc>
+              <a:spcBef>
+                <a:spcPts val="0"/>
+              </a:spcBef>
+              <a:spcAft>
+                <a:spcPts val="0"/>
+              </a:spcAft>
+              <a:buSzPts val="5200"/>
+              <a:buNone/>
+            </a:pPr>
+            <a:endParaRPr sz="3600" b="1" dirty="0">
+              <a:solidFill>
+                <a:schemeClr val="tx1"/>
+              </a:solidFill>
+              <a:latin typeface="Montserrat"/>
+              <a:ea typeface="Montserrat"/>
+              <a:cs typeface="Montserrat"/>
+              <a:sym typeface="Montserrat"/>
+            </a:endParaRPr>
+          </a:p>
+          <a:p>
+            <a:pPr marL="0" lvl="0" indent="0" algn="ctr" rtl="0">
+              <a:spcBef>
+                <a:spcPts val="0"/>
+              </a:spcBef>
+              <a:spcAft>
+                <a:spcPts val="0"/>
+              </a:spcAft>
+              <a:buSzPts val="5200"/>
+              <a:buNone/>
+            </a:pPr>
+            <a:br>
+              <a:rPr lang="en-US" sz="1600" b="1" dirty="0">
+                <a:solidFill>
+                  <a:schemeClr val="tx1"/>
+                </a:solidFill>
+                <a:latin typeface="Montserrat"/>
+                <a:ea typeface="Montserrat"/>
+                <a:cs typeface="Montserrat"/>
+                <a:sym typeface="Montserrat"/>
+              </a:rPr>
+            </a:br>
+            <a:br>
+              <a:rPr lang="en-US" sz="1600" b="1" dirty="0">
+                <a:solidFill>
+                  <a:schemeClr val="tx1"/>
+                </a:solidFill>
+                <a:latin typeface="Montserrat"/>
+                <a:ea typeface="Montserrat"/>
+                <a:cs typeface="Montserrat"/>
+                <a:sym typeface="Montserrat"/>
+              </a:rPr>
+            </a:br>
+            <a:br>
+              <a:rPr lang="en-US" sz="1600" b="1" dirty="0">
+                <a:solidFill>
+                  <a:schemeClr val="tx1"/>
+                </a:solidFill>
+                <a:latin typeface="Montserrat"/>
+                <a:ea typeface="Montserrat"/>
+                <a:cs typeface="Montserrat"/>
+                <a:sym typeface="Montserrat"/>
+              </a:rPr>
+            </a:br>
+            <a:br>
+              <a:rPr lang="en-US" sz="1600" b="1" dirty="0">
+                <a:solidFill>
+                  <a:schemeClr val="tx1"/>
+                </a:solidFill>
+                <a:latin typeface="Montserrat"/>
+                <a:ea typeface="Montserrat"/>
+                <a:cs typeface="Montserrat"/>
+                <a:sym typeface="Montserrat"/>
+              </a:rPr>
+            </a:br>
+            <a:r>
+              <a:rPr lang="en-US" sz="1600" b="1" dirty="0">
+                <a:solidFill>
+                  <a:schemeClr val="tx1"/>
+                </a:solidFill>
+                <a:latin typeface="Montserrat"/>
+                <a:ea typeface="Montserrat"/>
+                <a:cs typeface="Montserrat"/>
+                <a:sym typeface="Montserrat"/>
+              </a:rPr>
               <a:t>Frequency Distribution(Histogram Plot) of Churned vs Non Churned Users based Total price users were charged used during day, evening and night </a:t>
             </a:r>
             <a:endParaRPr sz="1600" b="1" dirty="0">
@@ -15050,7 +15939,7 @@
 </p:sld>
 </file>
 
-<file path=ppt/slides/slide8.xml><?xml version="1.0" encoding="utf-8"?>
+<file path=ppt/slides/slide9.xml><?xml version="1.0" encoding="utf-8"?>
 <p:sld xmlns:a="http://schemas.openxmlformats.org/drawingml/2006/main" xmlns:r="http://schemas.openxmlformats.org/officeDocument/2006/relationships" xmlns:p="http://schemas.openxmlformats.org/presentationml/2006/main">
   <p:cSld>
     <p:spTree>
@@ -15316,249 +16205,6 @@
     <p:extLst>
       <p:ext uri="{BB962C8B-B14F-4D97-AF65-F5344CB8AC3E}">
         <p14:creationId xmlns:p14="http://schemas.microsoft.com/office/powerpoint/2010/main" val="393741436"/>
-      </p:ext>
-    </p:extLst>
-  </p:cSld>
-  <p:clrMapOvr>
-    <a:masterClrMapping/>
-  </p:clrMapOvr>
-</p:sld>
-</file>
-
-<file path=ppt/slides/slide9.xml><?xml version="1.0" encoding="utf-8"?>
-<p:sld xmlns:a="http://schemas.openxmlformats.org/drawingml/2006/main" xmlns:r="http://schemas.openxmlformats.org/officeDocument/2006/relationships" xmlns:p="http://schemas.openxmlformats.org/presentationml/2006/main">
-  <p:cSld>
-    <p:spTree>
-      <p:nvGrpSpPr>
-        <p:cNvPr id="1" name="Shape 59"/>
-        <p:cNvGrpSpPr/>
-        <p:nvPr/>
-      </p:nvGrpSpPr>
-      <p:grpSpPr>
-        <a:xfrm>
-          <a:off x="0" y="0"/>
-          <a:ext cx="0" cy="0"/>
-          <a:chOff x="0" y="0"/>
-          <a:chExt cx="0" cy="0"/>
-        </a:xfrm>
-      </p:grpSpPr>
-      <p:sp>
-        <p:nvSpPr>
-          <p:cNvPr id="60" name="Google Shape;60;p14"/>
-          <p:cNvSpPr txBox="1">
-            <a:spLocks noGrp="1"/>
-          </p:cNvSpPr>
-          <p:nvPr>
-            <p:ph type="title"/>
-          </p:nvPr>
-        </p:nvSpPr>
-        <p:spPr>
-          <a:prstGeom prst="rect">
-            <a:avLst/>
-          </a:prstGeom>
-          <a:noFill/>
-          <a:ln>
-            <a:noFill/>
-          </a:ln>
-        </p:spPr>
-        <p:txBody>
-          <a:bodyPr spcFirstLastPara="1" wrap="square" lIns="91425" tIns="91425" rIns="91425" bIns="91425" anchor="b" anchorCtr="0">
-            <a:noAutofit/>
-          </a:bodyPr>
-          <a:lstStyle/>
-          <a:p>
-            <a:pPr marL="0" lvl="0" indent="0" algn="l" rtl="0">
-              <a:lnSpc>
-                <a:spcPct val="100000"/>
-              </a:lnSpc>
-              <a:spcBef>
-                <a:spcPts val="0"/>
-              </a:spcBef>
-              <a:spcAft>
-                <a:spcPts val="0"/>
-              </a:spcAft>
-              <a:buSzPts val="5200"/>
-              <a:buNone/>
-            </a:pPr>
-            <a:endParaRPr sz="2400" b="1" dirty="0">
-              <a:solidFill>
-                <a:schemeClr val="lt1"/>
-              </a:solidFill>
-              <a:latin typeface="Montserrat"/>
-              <a:ea typeface="Montserrat"/>
-              <a:cs typeface="Montserrat"/>
-              <a:sym typeface="Montserrat"/>
-            </a:endParaRPr>
-          </a:p>
-          <a:p>
-            <a:pPr marL="0" lvl="0" indent="0" algn="ctr" rtl="0">
-              <a:lnSpc>
-                <a:spcPct val="100000"/>
-              </a:lnSpc>
-              <a:spcBef>
-                <a:spcPts val="0"/>
-              </a:spcBef>
-              <a:spcAft>
-                <a:spcPts val="0"/>
-              </a:spcAft>
-              <a:buSzPts val="5200"/>
-              <a:buNone/>
-            </a:pPr>
-            <a:endParaRPr sz="2400" b="1" dirty="0">
-              <a:solidFill>
-                <a:schemeClr val="lt1"/>
-              </a:solidFill>
-              <a:latin typeface="Montserrat"/>
-              <a:ea typeface="Montserrat"/>
-              <a:cs typeface="Montserrat"/>
-              <a:sym typeface="Montserrat"/>
-            </a:endParaRPr>
-          </a:p>
-          <a:p>
-            <a:pPr marL="0" lvl="0" indent="0" algn="ctr" rtl="0">
-              <a:spcBef>
-                <a:spcPts val="0"/>
-              </a:spcBef>
-              <a:spcAft>
-                <a:spcPts val="0"/>
-              </a:spcAft>
-              <a:buSzPts val="5200"/>
-              <a:buNone/>
-            </a:pPr>
-            <a:endParaRPr sz="2400" b="1" dirty="0">
-              <a:solidFill>
-                <a:schemeClr val="lt1"/>
-              </a:solidFill>
-              <a:latin typeface="Montserrat"/>
-              <a:ea typeface="Montserrat"/>
-              <a:cs typeface="Montserrat"/>
-              <a:sym typeface="Montserrat"/>
-            </a:endParaRPr>
-          </a:p>
-          <a:p>
-            <a:pPr marL="0" lvl="0" indent="0" algn="ctr" rtl="0">
-              <a:spcBef>
-                <a:spcPts val="0"/>
-              </a:spcBef>
-              <a:spcAft>
-                <a:spcPts val="0"/>
-              </a:spcAft>
-              <a:buSzPts val="5200"/>
-              <a:buNone/>
-            </a:pPr>
-            <a:r>
-              <a:rPr lang="en-US" sz="2400" b="1" dirty="0">
-                <a:solidFill>
-                  <a:schemeClr val="tx1"/>
-                </a:solidFill>
-                <a:latin typeface="Montserrat"/>
-                <a:ea typeface="Montserrat"/>
-                <a:cs typeface="Montserrat"/>
-                <a:sym typeface="Montserrat"/>
-              </a:rPr>
-              <a:t>Area Code Based Analysis</a:t>
-            </a:r>
-            <a:endParaRPr sz="2400" b="1" dirty="0">
-              <a:solidFill>
-                <a:schemeClr val="tx1"/>
-              </a:solidFill>
-              <a:latin typeface="Montserrat"/>
-              <a:ea typeface="Montserrat"/>
-              <a:cs typeface="Montserrat"/>
-              <a:sym typeface="Montserrat"/>
-            </a:endParaRPr>
-          </a:p>
-        </p:txBody>
-      </p:sp>
-      <p:sp>
-        <p:nvSpPr>
-          <p:cNvPr id="2" name="Text Placeholder 1">
-            <a:extLst>
-              <a:ext uri="{FF2B5EF4-FFF2-40B4-BE49-F238E27FC236}">
-                <a16:creationId xmlns:a16="http://schemas.microsoft.com/office/drawing/2014/main" id="{F46FBC8D-B97E-02F6-4661-E3112A5929A9}"/>
-              </a:ext>
-            </a:extLst>
-          </p:cNvPr>
-          <p:cNvSpPr>
-            <a:spLocks noGrp="1"/>
-          </p:cNvSpPr>
-          <p:nvPr>
-            <p:ph type="body" idx="1"/>
-          </p:nvPr>
-        </p:nvSpPr>
-        <p:spPr/>
-        <p:txBody>
-          <a:bodyPr/>
-          <a:lstStyle/>
-          <a:p>
-            <a:pPr marL="114300" indent="0">
-              <a:buNone/>
-            </a:pPr>
-            <a:r>
-              <a:rPr lang="en-US" dirty="0">
-                <a:solidFill>
-                  <a:schemeClr val="accent3"/>
-                </a:solidFill>
-              </a:rPr>
-              <a:t>We figured out from Data that there are total 3 Area Codes(415,408,510) to which users belongs to. To make analysis easier we created a nested python dictionary of the following type:</a:t>
-            </a:r>
-          </a:p>
-          <a:p>
-            <a:pPr marL="114300" indent="0">
-              <a:buNone/>
-            </a:pPr>
-            <a:endParaRPr lang="en-US" dirty="0">
-              <a:solidFill>
-                <a:schemeClr val="accent3"/>
-              </a:solidFill>
-            </a:endParaRPr>
-          </a:p>
-          <a:p>
-            <a:pPr marL="114300" indent="0">
-              <a:buNone/>
-            </a:pPr>
-            <a:endParaRPr lang="en-IN" dirty="0">
-              <a:solidFill>
-                <a:schemeClr val="accent3"/>
-              </a:solidFill>
-            </a:endParaRPr>
-          </a:p>
-        </p:txBody>
-      </p:sp>
-      <p:pic>
-        <p:nvPicPr>
-          <p:cNvPr id="4" name="Picture 3">
-            <a:extLst>
-              <a:ext uri="{FF2B5EF4-FFF2-40B4-BE49-F238E27FC236}">
-                <a16:creationId xmlns:a16="http://schemas.microsoft.com/office/drawing/2014/main" id="{74A7098B-B9FC-670A-93C0-AEBE7E69D217}"/>
-              </a:ext>
-            </a:extLst>
-          </p:cNvPr>
-          <p:cNvPicPr>
-            <a:picLocks noChangeAspect="1"/>
-          </p:cNvPicPr>
-          <p:nvPr/>
-        </p:nvPicPr>
-        <p:blipFill>
-          <a:blip r:embed="rId3"/>
-          <a:stretch>
-            <a:fillRect/>
-          </a:stretch>
-        </p:blipFill>
-        <p:spPr>
-          <a:xfrm>
-            <a:off x="995680" y="2424333"/>
-            <a:ext cx="6915573" cy="2286198"/>
-          </a:xfrm>
-          <a:prstGeom prst="rect">
-            <a:avLst/>
-          </a:prstGeom>
-        </p:spPr>
-      </p:pic>
-    </p:spTree>
-    <p:extLst>
-      <p:ext uri="{BB962C8B-B14F-4D97-AF65-F5344CB8AC3E}">
-        <p14:creationId xmlns:p14="http://schemas.microsoft.com/office/powerpoint/2010/main" val="110860667"/>
       </p:ext>
     </p:extLst>
   </p:cSld>

</xml_diff>